<commit_message>
updated README with architecture and design principles
</commit_message>
<xml_diff>
--- a/diagrams/architecture.pptx
+++ b/diagrams/architecture.pptx
@@ -104,6 +104,11 @@
       </a:defRPr>
     </a:lvl9pPr>
   </p:defaultTextStyle>
+  <p:extLst>
+    <p:ext uri="{EFAFB233-063F-42B5-8137-9DF3F51BA10A}">
+      <p15:sldGuideLst xmlns:p15="http://schemas.microsoft.com/office/powerpoint/2012/main"/>
+    </p:ext>
+  </p:extLst>
 </p:presentation>
 </file>
 
@@ -3327,10 +3332,10 @@
       </p:grpSpPr>
       <p:sp>
         <p:nvSpPr>
-          <p:cNvPr id="33" name="Rectangle 32">
-            <a:extLst>
-              <a:ext uri="{FF2B5EF4-FFF2-40B4-BE49-F238E27FC236}">
-                <a16:creationId xmlns:a16="http://schemas.microsoft.com/office/drawing/2014/main" id="{3CFD5A33-F183-4AD9-971E-950F9F3F1588}"/>
+          <p:cNvPr id="36" name="Rectangle 35">
+            <a:extLst>
+              <a:ext uri="{FF2B5EF4-FFF2-40B4-BE49-F238E27FC236}">
+                <a16:creationId xmlns:a16="http://schemas.microsoft.com/office/drawing/2014/main" id="{985087B1-8DD2-42F4-A6AE-43E5824E049F}"/>
               </a:ext>
             </a:extLst>
           </p:cNvPr>
@@ -3339,8 +3344,73 @@
         </p:nvSpPr>
         <p:spPr>
           <a:xfrm>
-            <a:off x="3747048" y="825471"/>
-            <a:ext cx="3211314" cy="5828090"/>
+            <a:off x="7125682" y="407148"/>
+            <a:ext cx="3211314" cy="4349902"/>
+          </a:xfrm>
+          <a:prstGeom prst="rect">
+            <a:avLst/>
+          </a:prstGeom>
+          <a:solidFill>
+            <a:schemeClr val="bg1">
+              <a:lumMod val="85000"/>
+            </a:schemeClr>
+          </a:solidFill>
+          <a:ln>
+            <a:solidFill>
+              <a:schemeClr val="tx1"/>
+            </a:solidFill>
+          </a:ln>
+        </p:spPr>
+        <p:style>
+          <a:lnRef idx="2">
+            <a:schemeClr val="accent1">
+              <a:shade val="50000"/>
+            </a:schemeClr>
+          </a:lnRef>
+          <a:fillRef idx="1">
+            <a:schemeClr val="accent1"/>
+          </a:fillRef>
+          <a:effectRef idx="0">
+            <a:schemeClr val="accent1"/>
+          </a:effectRef>
+          <a:fontRef idx="minor">
+            <a:schemeClr val="lt1"/>
+          </a:fontRef>
+        </p:style>
+        <p:txBody>
+          <a:bodyPr rtlCol="0" anchor="b"/>
+          <a:lstStyle/>
+          <a:p>
+            <a:pPr algn="ctr"/>
+            <a:r>
+              <a:rPr lang="en-US" sz="1400" dirty="0">
+                <a:solidFill>
+                  <a:schemeClr val="tx1"/>
+                </a:solidFill>
+                <a:latin typeface="Segoe UI Light" panose="020B0502040204020203" pitchFamily="34" charset="0"/>
+                <a:cs typeface="Segoe UI Light" panose="020B0502040204020203" pitchFamily="34" charset="0"/>
+              </a:rPr>
+              <a:t>Power BI</a:t>
+            </a:r>
+          </a:p>
+        </p:txBody>
+      </p:sp>
+      <p:sp>
+        <p:nvSpPr>
+          <p:cNvPr id="33" name="Rectangle 32">
+            <a:extLst>
+              <a:ext uri="{FF2B5EF4-FFF2-40B4-BE49-F238E27FC236}">
+                <a16:creationId xmlns:a16="http://schemas.microsoft.com/office/drawing/2014/main" id="{3CFD5A33-F183-4AD9-971E-950F9F3F1588}"/>
+              </a:ext>
+            </a:extLst>
+          </p:cNvPr>
+          <p:cNvSpPr/>
+          <p:nvPr/>
+        </p:nvSpPr>
+        <p:spPr>
+          <a:xfrm>
+            <a:off x="3747048" y="415564"/>
+            <a:ext cx="3211314" cy="6040415"/>
           </a:xfrm>
           <a:prstGeom prst="rect">
             <a:avLst/>
@@ -3432,7 +3502,7 @@
         </p:nvSpPr>
         <p:spPr>
           <a:xfrm>
-            <a:off x="7931777" y="5412281"/>
+            <a:off x="7895535" y="4954396"/>
             <a:ext cx="1212659" cy="1236206"/>
           </a:xfrm>
           <a:prstGeom prst="rect">
@@ -3498,7 +3568,7 @@
         </p:nvSpPr>
         <p:spPr>
           <a:xfrm>
-            <a:off x="684385" y="3209640"/>
+            <a:off x="684385" y="1735495"/>
             <a:ext cx="1212659" cy="1236206"/>
           </a:xfrm>
           <a:prstGeom prst="rect">
@@ -3561,7 +3631,7 @@
         </p:nvSpPr>
         <p:spPr>
           <a:xfrm>
-            <a:off x="7927227" y="1923681"/>
+            <a:off x="8909816" y="1963033"/>
             <a:ext cx="1212659" cy="1236206"/>
           </a:xfrm>
           <a:prstGeom prst="rect">
@@ -3601,22 +3671,34 @@
           <a:p>
             <a:pPr algn="ctr"/>
             <a:r>
-              <a:rPr lang="en-US" sz="1400" dirty="0" err="1">
+              <a:rPr lang="en-US" sz="1400" dirty="0">
                 <a:solidFill>
                   <a:schemeClr val="tx1"/>
                 </a:solidFill>
                 <a:latin typeface="Segoe UI Light" panose="020B0502040204020203" pitchFamily="34" charset="0"/>
                 <a:cs typeface="Segoe UI Light" panose="020B0502040204020203" pitchFamily="34" charset="0"/>
               </a:rPr>
-              <a:t>PowerBI</a:t>
-            </a:r>
-            <a:endParaRPr lang="en-US" sz="1400" dirty="0">
-              <a:solidFill>
-                <a:schemeClr val="tx1"/>
-              </a:solidFill>
-              <a:latin typeface="Segoe UI Light" panose="020B0502040204020203" pitchFamily="34" charset="0"/>
-              <a:cs typeface="Segoe UI Light" panose="020B0502040204020203" pitchFamily="34" charset="0"/>
-            </a:endParaRPr>
+              <a:t>Power BI</a:t>
+            </a:r>
+            <a:br>
+              <a:rPr lang="en-US" sz="1400" dirty="0">
+                <a:solidFill>
+                  <a:schemeClr val="tx1"/>
+                </a:solidFill>
+                <a:latin typeface="Segoe UI Light" panose="020B0502040204020203" pitchFamily="34" charset="0"/>
+                <a:cs typeface="Segoe UI Light" panose="020B0502040204020203" pitchFamily="34" charset="0"/>
+              </a:rPr>
+            </a:br>
+            <a:r>
+              <a:rPr lang="en-US" sz="1400" dirty="0">
+                <a:solidFill>
+                  <a:schemeClr val="tx1"/>
+                </a:solidFill>
+                <a:latin typeface="Segoe UI Light" panose="020B0502040204020203" pitchFamily="34" charset="0"/>
+                <a:cs typeface="Segoe UI Light" panose="020B0502040204020203" pitchFamily="34" charset="0"/>
+              </a:rPr>
+              <a:t>report</a:t>
+            </a:r>
           </a:p>
         </p:txBody>
       </p:sp>
@@ -3634,8 +3716,8 @@
         </p:nvSpPr>
         <p:spPr>
           <a:xfrm>
-            <a:off x="4097523" y="2592323"/>
-            <a:ext cx="2527355" cy="2819958"/>
+            <a:off x="4097523" y="1898135"/>
+            <a:ext cx="4638333" cy="2509948"/>
           </a:xfrm>
           <a:prstGeom prst="rect">
             <a:avLst/>
@@ -3644,6 +3726,7 @@
             <a:schemeClr val="accent2">
               <a:lumMod val="20000"/>
               <a:lumOff val="80000"/>
+              <a:alpha val="60000"/>
             </a:schemeClr>
           </a:solidFill>
           <a:ln>
@@ -3700,8 +3783,8 @@
         </p:nvSpPr>
         <p:spPr>
           <a:xfrm>
-            <a:off x="4097523" y="995534"/>
-            <a:ext cx="2527355" cy="1149867"/>
+            <a:off x="4097523" y="585628"/>
+            <a:ext cx="4638333" cy="1149867"/>
           </a:xfrm>
           <a:prstGeom prst="rect">
             <a:avLst/>
@@ -3710,6 +3793,7 @@
             <a:schemeClr val="accent2">
               <a:lumMod val="20000"/>
               <a:lumOff val="80000"/>
+              <a:alpha val="60000"/>
             </a:schemeClr>
           </a:solidFill>
           <a:ln>
@@ -3780,7 +3864,7 @@
         </p:blipFill>
         <p:spPr>
           <a:xfrm>
-            <a:off x="893351" y="3340954"/>
+            <a:off x="896762" y="1875226"/>
             <a:ext cx="780290" cy="780290"/>
           </a:xfrm>
           <a:prstGeom prst="rect">
@@ -3816,7 +3900,7 @@
         </p:blipFill>
         <p:spPr>
           <a:xfrm>
-            <a:off x="4401956" y="1143391"/>
+            <a:off x="4401956" y="733485"/>
             <a:ext cx="780290" cy="780290"/>
           </a:xfrm>
           <a:prstGeom prst="rect">
@@ -3852,7 +3936,7 @@
         </p:blipFill>
         <p:spPr>
           <a:xfrm>
-            <a:off x="5622230" y="1143391"/>
+            <a:off x="5622230" y="733485"/>
             <a:ext cx="780290" cy="780290"/>
           </a:xfrm>
           <a:prstGeom prst="rect">
@@ -3888,7 +3972,7 @@
         </p:blipFill>
         <p:spPr>
           <a:xfrm>
-            <a:off x="8149668" y="5605356"/>
+            <a:off x="8113426" y="5158960"/>
             <a:ext cx="780290" cy="780290"/>
           </a:xfrm>
           <a:prstGeom prst="rect">
@@ -3898,10 +3982,46 @@
       </p:pic>
       <p:pic>
         <p:nvPicPr>
-          <p:cNvPr id="17" name="Picture 16">
-            <a:extLst>
-              <a:ext uri="{FF2B5EF4-FFF2-40B4-BE49-F238E27FC236}">
-                <a16:creationId xmlns:a16="http://schemas.microsoft.com/office/drawing/2014/main" id="{748CF134-2BC9-42C1-BA1A-8941BC3BFC86}"/>
+          <p:cNvPr id="18" name="Picture 17">
+            <a:extLst>
+              <a:ext uri="{FF2B5EF4-FFF2-40B4-BE49-F238E27FC236}">
+                <a16:creationId xmlns:a16="http://schemas.microsoft.com/office/drawing/2014/main" id="{1E17A7BF-C1E1-4044-89B6-AC04A2545E19}"/>
+              </a:ext>
+            </a:extLst>
+          </p:cNvPr>
+          <p:cNvPicPr>
+            <a:picLocks noChangeAspect="1"/>
+          </p:cNvPicPr>
+          <p:nvPr/>
+        </p:nvPicPr>
+        <p:blipFill>
+          <a:blip r:embed="rId3">
+            <a:extLst>
+              <a:ext uri="{28A0092B-C50C-407E-A947-70E740481C1C}">
+                <a14:useLocalDpi xmlns:a14="http://schemas.microsoft.com/office/drawing/2010/main" val="0"/>
+              </a:ext>
+            </a:extLst>
+          </a:blip>
+          <a:stretch>
+            <a:fillRect/>
+          </a:stretch>
+        </p:blipFill>
+        <p:spPr>
+          <a:xfrm>
+            <a:off x="4401956" y="1975684"/>
+            <a:ext cx="780290" cy="780290"/>
+          </a:xfrm>
+          <a:prstGeom prst="rect">
+            <a:avLst/>
+          </a:prstGeom>
+        </p:spPr>
+      </p:pic>
+      <p:pic>
+        <p:nvPicPr>
+          <p:cNvPr id="20" name="Picture 19">
+            <a:extLst>
+              <a:ext uri="{FF2B5EF4-FFF2-40B4-BE49-F238E27FC236}">
+                <a16:creationId xmlns:a16="http://schemas.microsoft.com/office/drawing/2014/main" id="{A8E9C371-A0B8-4563-A7D2-1F0AC8131110}"/>
               </a:ext>
             </a:extLst>
           </p:cNvPr>
@@ -3924,7 +4044,7 @@
         </p:blipFill>
         <p:spPr>
           <a:xfrm>
-            <a:off x="8145118" y="2095778"/>
+            <a:off x="4401956" y="2801739"/>
             <a:ext cx="780290" cy="780290"/>
           </a:xfrm>
           <a:prstGeom prst="rect">
@@ -3934,10 +4054,46 @@
       </p:pic>
       <p:pic>
         <p:nvPicPr>
-          <p:cNvPr id="18" name="Picture 17">
-            <a:extLst>
-              <a:ext uri="{FF2B5EF4-FFF2-40B4-BE49-F238E27FC236}">
-                <a16:creationId xmlns:a16="http://schemas.microsoft.com/office/drawing/2014/main" id="{1E17A7BF-C1E1-4044-89B6-AC04A2545E19}"/>
+          <p:cNvPr id="22" name="Picture 21">
+            <a:extLst>
+              <a:ext uri="{FF2B5EF4-FFF2-40B4-BE49-F238E27FC236}">
+                <a16:creationId xmlns:a16="http://schemas.microsoft.com/office/drawing/2014/main" id="{D68FCBEF-6770-4DF6-8357-59FF270D9559}"/>
+              </a:ext>
+            </a:extLst>
+          </p:cNvPr>
+          <p:cNvPicPr>
+            <a:picLocks noChangeAspect="1"/>
+          </p:cNvPicPr>
+          <p:nvPr/>
+        </p:nvPicPr>
+        <p:blipFill>
+          <a:blip r:embed="rId4">
+            <a:extLst>
+              <a:ext uri="{28A0092B-C50C-407E-A947-70E740481C1C}">
+                <a14:useLocalDpi xmlns:a14="http://schemas.microsoft.com/office/drawing/2010/main" val="0"/>
+              </a:ext>
+            </a:extLst>
+          </a:blip>
+          <a:stretch>
+            <a:fillRect/>
+          </a:stretch>
+        </p:blipFill>
+        <p:spPr>
+          <a:xfrm>
+            <a:off x="5622230" y="2807165"/>
+            <a:ext cx="780290" cy="780290"/>
+          </a:xfrm>
+          <a:prstGeom prst="rect">
+            <a:avLst/>
+          </a:prstGeom>
+        </p:spPr>
+      </p:pic>
+      <p:pic>
+        <p:nvPicPr>
+          <p:cNvPr id="27" name="Picture 26">
+            <a:extLst>
+              <a:ext uri="{FF2B5EF4-FFF2-40B4-BE49-F238E27FC236}">
+                <a16:creationId xmlns:a16="http://schemas.microsoft.com/office/drawing/2014/main" id="{5D2D98DA-6337-436A-853F-872B57843551}"/>
               </a:ext>
             </a:extLst>
           </p:cNvPr>
@@ -3960,7 +4116,7 @@
         </p:blipFill>
         <p:spPr>
           <a:xfrm>
-            <a:off x="4401956" y="2795501"/>
+            <a:off x="4401956" y="3627793"/>
             <a:ext cx="780290" cy="780290"/>
           </a:xfrm>
           <a:prstGeom prst="rect">
@@ -3970,10 +4126,10 @@
       </p:pic>
       <p:pic>
         <p:nvPicPr>
-          <p:cNvPr id="20" name="Picture 19">
-            <a:extLst>
-              <a:ext uri="{FF2B5EF4-FFF2-40B4-BE49-F238E27FC236}">
-                <a16:creationId xmlns:a16="http://schemas.microsoft.com/office/drawing/2014/main" id="{A8E9C371-A0B8-4563-A7D2-1F0AC8131110}"/>
+          <p:cNvPr id="35" name="Picture 34">
+            <a:extLst>
+              <a:ext uri="{FF2B5EF4-FFF2-40B4-BE49-F238E27FC236}">
+                <a16:creationId xmlns:a16="http://schemas.microsoft.com/office/drawing/2014/main" id="{11F5B9DB-38E1-4674-BC5B-3DD3A7902497}"/>
               </a:ext>
             </a:extLst>
           </p:cNvPr>
@@ -3996,115 +4152,7 @@
         </p:blipFill>
         <p:spPr>
           <a:xfrm>
-            <a:off x="4401956" y="3621556"/>
-            <a:ext cx="780290" cy="780290"/>
-          </a:xfrm>
-          <a:prstGeom prst="rect">
-            <a:avLst/>
-          </a:prstGeom>
-        </p:spPr>
-      </p:pic>
-      <p:pic>
-        <p:nvPicPr>
-          <p:cNvPr id="22" name="Picture 21">
-            <a:extLst>
-              <a:ext uri="{FF2B5EF4-FFF2-40B4-BE49-F238E27FC236}">
-                <a16:creationId xmlns:a16="http://schemas.microsoft.com/office/drawing/2014/main" id="{D68FCBEF-6770-4DF6-8357-59FF270D9559}"/>
-              </a:ext>
-            </a:extLst>
-          </p:cNvPr>
-          <p:cNvPicPr>
-            <a:picLocks noChangeAspect="1"/>
-          </p:cNvPicPr>
-          <p:nvPr/>
-        </p:nvPicPr>
-        <p:blipFill>
-          <a:blip r:embed="rId4">
-            <a:extLst>
-              <a:ext uri="{28A0092B-C50C-407E-A947-70E740481C1C}">
-                <a14:useLocalDpi xmlns:a14="http://schemas.microsoft.com/office/drawing/2010/main" val="0"/>
-              </a:ext>
-            </a:extLst>
-          </a:blip>
-          <a:stretch>
-            <a:fillRect/>
-          </a:stretch>
-        </p:blipFill>
-        <p:spPr>
-          <a:xfrm>
-            <a:off x="5622230" y="3626982"/>
-            <a:ext cx="780290" cy="780290"/>
-          </a:xfrm>
-          <a:prstGeom prst="rect">
-            <a:avLst/>
-          </a:prstGeom>
-        </p:spPr>
-      </p:pic>
-      <p:pic>
-        <p:nvPicPr>
-          <p:cNvPr id="27" name="Picture 26">
-            <a:extLst>
-              <a:ext uri="{FF2B5EF4-FFF2-40B4-BE49-F238E27FC236}">
-                <a16:creationId xmlns:a16="http://schemas.microsoft.com/office/drawing/2014/main" id="{5D2D98DA-6337-436A-853F-872B57843551}"/>
-              </a:ext>
-            </a:extLst>
-          </p:cNvPr>
-          <p:cNvPicPr>
-            <a:picLocks noChangeAspect="1"/>
-          </p:cNvPicPr>
-          <p:nvPr/>
-        </p:nvPicPr>
-        <p:blipFill>
-          <a:blip r:embed="rId3">
-            <a:extLst>
-              <a:ext uri="{28A0092B-C50C-407E-A947-70E740481C1C}">
-                <a14:useLocalDpi xmlns:a14="http://schemas.microsoft.com/office/drawing/2010/main" val="0"/>
-              </a:ext>
-            </a:extLst>
-          </a:blip>
-          <a:stretch>
-            <a:fillRect/>
-          </a:stretch>
-        </p:blipFill>
-        <p:spPr>
-          <a:xfrm>
-            <a:off x="4401956" y="4447610"/>
-            <a:ext cx="780290" cy="780290"/>
-          </a:xfrm>
-          <a:prstGeom prst="rect">
-            <a:avLst/>
-          </a:prstGeom>
-        </p:spPr>
-      </p:pic>
-      <p:pic>
-        <p:nvPicPr>
-          <p:cNvPr id="35" name="Picture 34">
-            <a:extLst>
-              <a:ext uri="{FF2B5EF4-FFF2-40B4-BE49-F238E27FC236}">
-                <a16:creationId xmlns:a16="http://schemas.microsoft.com/office/drawing/2014/main" id="{11F5B9DB-38E1-4674-BC5B-3DD3A7902497}"/>
-              </a:ext>
-            </a:extLst>
-          </p:cNvPr>
-          <p:cNvPicPr>
-            <a:picLocks noChangeAspect="1"/>
-          </p:cNvPicPr>
-          <p:nvPr/>
-        </p:nvPicPr>
-        <p:blipFill>
-          <a:blip r:embed="rId8">
-            <a:extLst>
-              <a:ext uri="{28A0092B-C50C-407E-A947-70E740481C1C}">
-                <a14:useLocalDpi xmlns:a14="http://schemas.microsoft.com/office/drawing/2010/main" val="0"/>
-              </a:ext>
-            </a:extLst>
-          </a:blip>
-          <a:stretch>
-            <a:fillRect/>
-          </a:stretch>
-        </p:blipFill>
-        <p:spPr>
-          <a:xfrm>
-            <a:off x="5012093" y="5648848"/>
+            <a:off x="4975851" y="5190963"/>
             <a:ext cx="780290" cy="780290"/>
           </a:xfrm>
           <a:prstGeom prst="rect">
@@ -4123,15 +4171,15 @@
           </p:cNvPr>
           <p:cNvCxnSpPr>
             <a:cxnSpLocks/>
-            <a:stCxn id="13" idx="3"/>
+            <a:stCxn id="38" idx="3"/>
             <a:endCxn id="30" idx="1"/>
           </p:cNvCxnSpPr>
           <p:nvPr/>
         </p:nvCxnSpPr>
         <p:spPr>
           <a:xfrm>
-            <a:off x="6402520" y="1533536"/>
-            <a:ext cx="1524707" cy="1008248"/>
+            <a:off x="8149668" y="1123630"/>
+            <a:ext cx="760148" cy="1457506"/>
           </a:xfrm>
           <a:prstGeom prst="straightConnector1">
             <a:avLst/>
@@ -4160,69 +4208,21 @@
       </p:cxnSp>
       <p:cxnSp>
         <p:nvCxnSpPr>
-          <p:cNvPr id="40" name="Straight Arrow Connector 39">
-            <a:extLst>
-              <a:ext uri="{FF2B5EF4-FFF2-40B4-BE49-F238E27FC236}">
-                <a16:creationId xmlns:a16="http://schemas.microsoft.com/office/drawing/2014/main" id="{919773A1-0117-4E9B-8BDF-F989FFDA5876}"/>
+          <p:cNvPr id="46" name="Straight Arrow Connector 45">
+            <a:extLst>
+              <a:ext uri="{FF2B5EF4-FFF2-40B4-BE49-F238E27FC236}">
+                <a16:creationId xmlns:a16="http://schemas.microsoft.com/office/drawing/2014/main" id="{FA05FC87-397D-4B53-9803-02BF738A70DA}"/>
               </a:ext>
             </a:extLst>
           </p:cNvPr>
           <p:cNvCxnSpPr>
             <a:cxnSpLocks/>
-            <a:stCxn id="22" idx="3"/>
-            <a:endCxn id="30" idx="1"/>
           </p:cNvCxnSpPr>
           <p:nvPr/>
         </p:nvCxnSpPr>
         <p:spPr>
-          <a:xfrm flipV="1">
-            <a:off x="6402520" y="2541784"/>
-            <a:ext cx="1524707" cy="1475343"/>
-          </a:xfrm>
-          <a:prstGeom prst="straightConnector1">
-            <a:avLst/>
-          </a:prstGeom>
-          <a:ln w="19050">
-            <a:solidFill>
-              <a:schemeClr val="accent6"/>
-            </a:solidFill>
-            <a:tailEnd type="triangle"/>
-          </a:ln>
-        </p:spPr>
-        <p:style>
-          <a:lnRef idx="1">
-            <a:schemeClr val="accent1"/>
-          </a:lnRef>
-          <a:fillRef idx="0">
-            <a:schemeClr val="accent1"/>
-          </a:fillRef>
-          <a:effectRef idx="0">
-            <a:schemeClr val="accent1"/>
-          </a:effectRef>
-          <a:fontRef idx="minor">
-            <a:schemeClr val="tx1"/>
-          </a:fontRef>
-        </p:style>
-      </p:cxnSp>
-      <p:cxnSp>
-        <p:nvCxnSpPr>
-          <p:cNvPr id="46" name="Straight Arrow Connector 45">
-            <a:extLst>
-              <a:ext uri="{FF2B5EF4-FFF2-40B4-BE49-F238E27FC236}">
-                <a16:creationId xmlns:a16="http://schemas.microsoft.com/office/drawing/2014/main" id="{FA05FC87-397D-4B53-9803-02BF738A70DA}"/>
-              </a:ext>
-            </a:extLst>
-          </p:cNvPr>
-          <p:cNvCxnSpPr>
-            <a:cxnSpLocks/>
-            <a:stCxn id="32" idx="1"/>
-            <a:endCxn id="35" idx="3"/>
-          </p:cNvCxnSpPr>
-          <p:nvPr/>
-        </p:nvCxnSpPr>
-        <p:spPr>
           <a:xfrm flipH="1">
-            <a:off x="5792383" y="6030384"/>
+            <a:off x="5756141" y="5583988"/>
             <a:ext cx="2139394" cy="8609"/>
           </a:xfrm>
           <a:prstGeom prst="straightConnector1">
@@ -4268,8 +4268,8 @@
         </p:nvCxnSpPr>
         <p:spPr>
           <a:xfrm flipH="1">
-            <a:off x="1897044" y="1533536"/>
-            <a:ext cx="2504912" cy="2294207"/>
+            <a:off x="1897044" y="1123630"/>
+            <a:ext cx="2504912" cy="1229968"/>
           </a:xfrm>
           <a:prstGeom prst="straightConnector1">
             <a:avLst/>
@@ -4313,9 +4313,9 @@
           <p:nvPr/>
         </p:nvCxnSpPr>
         <p:spPr>
-          <a:xfrm flipH="1">
-            <a:off x="1897044" y="3185646"/>
-            <a:ext cx="2504912" cy="642097"/>
+          <a:xfrm flipH="1" flipV="1">
+            <a:off x="1897044" y="2353598"/>
+            <a:ext cx="2504912" cy="12231"/>
           </a:xfrm>
           <a:prstGeom prst="straightConnector1">
             <a:avLst/>
@@ -4360,8 +4360,8 @@
         </p:nvCxnSpPr>
         <p:spPr>
           <a:xfrm flipH="1" flipV="1">
-            <a:off x="1897044" y="3827743"/>
-            <a:ext cx="2504912" cy="1010012"/>
+            <a:off x="1897044" y="2353598"/>
+            <a:ext cx="2504912" cy="1664340"/>
           </a:xfrm>
           <a:prstGeom prst="straightConnector1">
             <a:avLst/>
@@ -4406,7 +4406,7 @@
         </p:nvCxnSpPr>
         <p:spPr>
           <a:xfrm>
-            <a:off x="5182246" y="3185646"/>
+            <a:off x="5182246" y="2365829"/>
             <a:ext cx="439984" cy="831481"/>
           </a:xfrm>
           <a:prstGeom prst="straightConnector1">
@@ -4452,7 +4452,7 @@
         </p:nvCxnSpPr>
         <p:spPr>
           <a:xfrm flipV="1">
-            <a:off x="5182246" y="4017127"/>
+            <a:off x="5182246" y="3197310"/>
             <a:ext cx="439984" cy="820628"/>
           </a:xfrm>
           <a:prstGeom prst="straightConnector1">
@@ -4498,7 +4498,7 @@
         </p:nvCxnSpPr>
         <p:spPr>
           <a:xfrm>
-            <a:off x="5182246" y="1533536"/>
+            <a:off x="5182246" y="1123630"/>
             <a:ext cx="439984" cy="0"/>
           </a:xfrm>
           <a:prstGeom prst="straightConnector1">
@@ -4543,7 +4543,7 @@
         </p:nvCxnSpPr>
         <p:spPr>
           <a:xfrm>
-            <a:off x="4792101" y="3408065"/>
+            <a:off x="4792101" y="2588248"/>
             <a:ext cx="0" cy="213491"/>
           </a:xfrm>
           <a:prstGeom prst="straightConnector1">
@@ -4587,7 +4587,7 @@
         </p:nvCxnSpPr>
         <p:spPr>
           <a:xfrm>
-            <a:off x="4792101" y="4339100"/>
+            <a:off x="4792101" y="3519283"/>
             <a:ext cx="0" cy="213491"/>
           </a:xfrm>
           <a:prstGeom prst="straightConnector1">
@@ -4596,6 +4596,251 @@
           <a:ln w="19050">
             <a:solidFill>
               <a:schemeClr val="accent2"/>
+            </a:solidFill>
+            <a:tailEnd type="triangle"/>
+          </a:ln>
+        </p:spPr>
+        <p:style>
+          <a:lnRef idx="1">
+            <a:schemeClr val="accent1"/>
+          </a:lnRef>
+          <a:fillRef idx="0">
+            <a:schemeClr val="accent1"/>
+          </a:fillRef>
+          <a:effectRef idx="0">
+            <a:schemeClr val="accent1"/>
+          </a:effectRef>
+          <a:fontRef idx="minor">
+            <a:schemeClr val="tx1"/>
+          </a:fontRef>
+        </p:style>
+      </p:cxnSp>
+      <p:pic>
+        <p:nvPicPr>
+          <p:cNvPr id="34" name="Picture 33">
+            <a:extLst>
+              <a:ext uri="{FF2B5EF4-FFF2-40B4-BE49-F238E27FC236}">
+                <a16:creationId xmlns:a16="http://schemas.microsoft.com/office/drawing/2014/main" id="{38D8E8AD-5BF7-4EDE-8B79-25FD005CEA01}"/>
+              </a:ext>
+            </a:extLst>
+          </p:cNvPr>
+          <p:cNvPicPr>
+            <a:picLocks noChangeAspect="1"/>
+          </p:cNvPicPr>
+          <p:nvPr/>
+        </p:nvPicPr>
+        <p:blipFill>
+          <a:blip r:embed="rId8">
+            <a:extLst>
+              <a:ext uri="{28A0092B-C50C-407E-A947-70E740481C1C}">
+                <a14:useLocalDpi xmlns:a14="http://schemas.microsoft.com/office/drawing/2010/main" val="0"/>
+              </a:ext>
+            </a:extLst>
+          </a:blip>
+          <a:stretch>
+            <a:fillRect/>
+          </a:stretch>
+        </p:blipFill>
+        <p:spPr>
+          <a:xfrm>
+            <a:off x="9186676" y="2088613"/>
+            <a:ext cx="631378" cy="631378"/>
+          </a:xfrm>
+          <a:prstGeom prst="rect">
+            <a:avLst/>
+          </a:prstGeom>
+        </p:spPr>
+      </p:pic>
+      <p:pic>
+        <p:nvPicPr>
+          <p:cNvPr id="38" name="Picture 37">
+            <a:extLst>
+              <a:ext uri="{FF2B5EF4-FFF2-40B4-BE49-F238E27FC236}">
+                <a16:creationId xmlns:a16="http://schemas.microsoft.com/office/drawing/2014/main" id="{797D835E-29AB-452B-B5C2-DD3DF078FBDC}"/>
+              </a:ext>
+            </a:extLst>
+          </p:cNvPr>
+          <p:cNvPicPr>
+            <a:picLocks noChangeAspect="1"/>
+          </p:cNvPicPr>
+          <p:nvPr/>
+        </p:nvPicPr>
+        <p:blipFill>
+          <a:blip r:embed="rId8">
+            <a:extLst>
+              <a:ext uri="{28A0092B-C50C-407E-A947-70E740481C1C}">
+                <a14:useLocalDpi xmlns:a14="http://schemas.microsoft.com/office/drawing/2010/main" val="0"/>
+              </a:ext>
+            </a:extLst>
+          </a:blip>
+          <a:stretch>
+            <a:fillRect/>
+          </a:stretch>
+        </p:blipFill>
+        <p:spPr>
+          <a:xfrm>
+            <a:off x="7518290" y="807941"/>
+            <a:ext cx="631378" cy="631378"/>
+          </a:xfrm>
+          <a:prstGeom prst="rect">
+            <a:avLst/>
+          </a:prstGeom>
+        </p:spPr>
+      </p:pic>
+      <p:cxnSp>
+        <p:nvCxnSpPr>
+          <p:cNvPr id="39" name="Straight Arrow Connector 38">
+            <a:extLst>
+              <a:ext uri="{FF2B5EF4-FFF2-40B4-BE49-F238E27FC236}">
+                <a16:creationId xmlns:a16="http://schemas.microsoft.com/office/drawing/2014/main" id="{A787052E-F219-4BAA-870F-CCABFA242989}"/>
+              </a:ext>
+            </a:extLst>
+          </p:cNvPr>
+          <p:cNvCxnSpPr>
+            <a:cxnSpLocks/>
+            <a:stCxn id="13" idx="3"/>
+            <a:endCxn id="38" idx="1"/>
+          </p:cNvCxnSpPr>
+          <p:nvPr/>
+        </p:nvCxnSpPr>
+        <p:spPr>
+          <a:xfrm>
+            <a:off x="6402520" y="1123630"/>
+            <a:ext cx="1115770" cy="0"/>
+          </a:xfrm>
+          <a:prstGeom prst="straightConnector1">
+            <a:avLst/>
+          </a:prstGeom>
+          <a:ln w="19050">
+            <a:solidFill>
+              <a:schemeClr val="accent2"/>
+            </a:solidFill>
+            <a:tailEnd type="triangle"/>
+          </a:ln>
+        </p:spPr>
+        <p:style>
+          <a:lnRef idx="1">
+            <a:schemeClr val="accent1"/>
+          </a:lnRef>
+          <a:fillRef idx="0">
+            <a:schemeClr val="accent1"/>
+          </a:fillRef>
+          <a:effectRef idx="0">
+            <a:schemeClr val="accent1"/>
+          </a:effectRef>
+          <a:fontRef idx="minor">
+            <a:schemeClr val="tx1"/>
+          </a:fontRef>
+        </p:style>
+      </p:cxnSp>
+      <p:pic>
+        <p:nvPicPr>
+          <p:cNvPr id="47" name="Picture 46">
+            <a:extLst>
+              <a:ext uri="{FF2B5EF4-FFF2-40B4-BE49-F238E27FC236}">
+                <a16:creationId xmlns:a16="http://schemas.microsoft.com/office/drawing/2014/main" id="{02519582-9E9B-41C6-9887-F874B707031D}"/>
+              </a:ext>
+            </a:extLst>
+          </p:cNvPr>
+          <p:cNvPicPr>
+            <a:picLocks noChangeAspect="1"/>
+          </p:cNvPicPr>
+          <p:nvPr/>
+        </p:nvPicPr>
+        <p:blipFill>
+          <a:blip r:embed="rId8">
+            <a:extLst>
+              <a:ext uri="{28A0092B-C50C-407E-A947-70E740481C1C}">
+                <a14:useLocalDpi xmlns:a14="http://schemas.microsoft.com/office/drawing/2010/main" val="0"/>
+              </a:ext>
+            </a:extLst>
+          </a:blip>
+          <a:stretch>
+            <a:fillRect/>
+          </a:stretch>
+        </p:blipFill>
+        <p:spPr>
+          <a:xfrm>
+            <a:off x="7518290" y="2875382"/>
+            <a:ext cx="631378" cy="631378"/>
+          </a:xfrm>
+          <a:prstGeom prst="rect">
+            <a:avLst/>
+          </a:prstGeom>
+        </p:spPr>
+      </p:pic>
+      <p:cxnSp>
+        <p:nvCxnSpPr>
+          <p:cNvPr id="48" name="Straight Arrow Connector 47">
+            <a:extLst>
+              <a:ext uri="{FF2B5EF4-FFF2-40B4-BE49-F238E27FC236}">
+                <a16:creationId xmlns:a16="http://schemas.microsoft.com/office/drawing/2014/main" id="{967A4CF4-8562-4053-9E1E-A56E67A4A39B}"/>
+              </a:ext>
+            </a:extLst>
+          </p:cNvPr>
+          <p:cNvCxnSpPr>
+            <a:cxnSpLocks/>
+            <a:endCxn id="47" idx="1"/>
+          </p:cNvCxnSpPr>
+          <p:nvPr/>
+        </p:nvCxnSpPr>
+        <p:spPr>
+          <a:xfrm>
+            <a:off x="6402520" y="3191071"/>
+            <a:ext cx="1115770" cy="0"/>
+          </a:xfrm>
+          <a:prstGeom prst="straightConnector1">
+            <a:avLst/>
+          </a:prstGeom>
+          <a:ln w="19050">
+            <a:solidFill>
+              <a:schemeClr val="accent2"/>
+            </a:solidFill>
+            <a:tailEnd type="triangle"/>
+          </a:ln>
+        </p:spPr>
+        <p:style>
+          <a:lnRef idx="1">
+            <a:schemeClr val="accent1"/>
+          </a:lnRef>
+          <a:fillRef idx="0">
+            <a:schemeClr val="accent1"/>
+          </a:fillRef>
+          <a:effectRef idx="0">
+            <a:schemeClr val="accent1"/>
+          </a:effectRef>
+          <a:fontRef idx="minor">
+            <a:schemeClr val="tx1"/>
+          </a:fontRef>
+        </p:style>
+      </p:cxnSp>
+      <p:cxnSp>
+        <p:nvCxnSpPr>
+          <p:cNvPr id="50" name="Straight Arrow Connector 49">
+            <a:extLst>
+              <a:ext uri="{FF2B5EF4-FFF2-40B4-BE49-F238E27FC236}">
+                <a16:creationId xmlns:a16="http://schemas.microsoft.com/office/drawing/2014/main" id="{02559F1B-786A-4333-B20D-F601DD41B51B}"/>
+              </a:ext>
+            </a:extLst>
+          </p:cNvPr>
+          <p:cNvCxnSpPr>
+            <a:cxnSpLocks/>
+            <a:stCxn id="47" idx="3"/>
+            <a:endCxn id="30" idx="1"/>
+          </p:cNvCxnSpPr>
+          <p:nvPr/>
+        </p:nvCxnSpPr>
+        <p:spPr>
+          <a:xfrm flipV="1">
+            <a:off x="8149668" y="2581136"/>
+            <a:ext cx="760148" cy="609935"/>
+          </a:xfrm>
+          <a:prstGeom prst="straightConnector1">
+            <a:avLst/>
+          </a:prstGeom>
+          <a:ln w="19050">
+            <a:solidFill>
+              <a:schemeClr val="accent6"/>
             </a:solidFill>
             <a:tailEnd type="triangle"/>
           </a:ln>

</xml_diff>

<commit_message>
Updated architecture and github-repositories ro store data in Cosmo DB
</commit_message>
<xml_diff>
--- a/diagrams/architecture.pptx
+++ b/diagrams/architecture.pptx
@@ -263,7 +263,7 @@
           <a:p>
             <a:fld id="{8D1FA75D-8100-4247-9756-C5A9A699BECD}" type="datetimeFigureOut">
               <a:rPr lang="en-US" smtClean="0"/>
-              <a:t>10-Sep-17</a:t>
+              <a:t>12-Sep-17</a:t>
             </a:fld>
             <a:endParaRPr lang="en-US"/>
           </a:p>
@@ -461,7 +461,7 @@
           <a:p>
             <a:fld id="{8D1FA75D-8100-4247-9756-C5A9A699BECD}" type="datetimeFigureOut">
               <a:rPr lang="en-US" smtClean="0"/>
-              <a:t>10-Sep-17</a:t>
+              <a:t>12-Sep-17</a:t>
             </a:fld>
             <a:endParaRPr lang="en-US"/>
           </a:p>
@@ -669,7 +669,7 @@
           <a:p>
             <a:fld id="{8D1FA75D-8100-4247-9756-C5A9A699BECD}" type="datetimeFigureOut">
               <a:rPr lang="en-US" smtClean="0"/>
-              <a:t>10-Sep-17</a:t>
+              <a:t>12-Sep-17</a:t>
             </a:fld>
             <a:endParaRPr lang="en-US"/>
           </a:p>
@@ -867,7 +867,7 @@
           <a:p>
             <a:fld id="{8D1FA75D-8100-4247-9756-C5A9A699BECD}" type="datetimeFigureOut">
               <a:rPr lang="en-US" smtClean="0"/>
-              <a:t>10-Sep-17</a:t>
+              <a:t>12-Sep-17</a:t>
             </a:fld>
             <a:endParaRPr lang="en-US"/>
           </a:p>
@@ -1142,7 +1142,7 @@
           <a:p>
             <a:fld id="{8D1FA75D-8100-4247-9756-C5A9A699BECD}" type="datetimeFigureOut">
               <a:rPr lang="en-US" smtClean="0"/>
-              <a:t>10-Sep-17</a:t>
+              <a:t>12-Sep-17</a:t>
             </a:fld>
             <a:endParaRPr lang="en-US"/>
           </a:p>
@@ -1407,7 +1407,7 @@
           <a:p>
             <a:fld id="{8D1FA75D-8100-4247-9756-C5A9A699BECD}" type="datetimeFigureOut">
               <a:rPr lang="en-US" smtClean="0"/>
-              <a:t>10-Sep-17</a:t>
+              <a:t>12-Sep-17</a:t>
             </a:fld>
             <a:endParaRPr lang="en-US"/>
           </a:p>
@@ -1819,7 +1819,7 @@
           <a:p>
             <a:fld id="{8D1FA75D-8100-4247-9756-C5A9A699BECD}" type="datetimeFigureOut">
               <a:rPr lang="en-US" smtClean="0"/>
-              <a:t>10-Sep-17</a:t>
+              <a:t>12-Sep-17</a:t>
             </a:fld>
             <a:endParaRPr lang="en-US"/>
           </a:p>
@@ -1960,7 +1960,7 @@
           <a:p>
             <a:fld id="{8D1FA75D-8100-4247-9756-C5A9A699BECD}" type="datetimeFigureOut">
               <a:rPr lang="en-US" smtClean="0"/>
-              <a:t>10-Sep-17</a:t>
+              <a:t>12-Sep-17</a:t>
             </a:fld>
             <a:endParaRPr lang="en-US"/>
           </a:p>
@@ -2073,7 +2073,7 @@
           <a:p>
             <a:fld id="{8D1FA75D-8100-4247-9756-C5A9A699BECD}" type="datetimeFigureOut">
               <a:rPr lang="en-US" smtClean="0"/>
-              <a:t>10-Sep-17</a:t>
+              <a:t>12-Sep-17</a:t>
             </a:fld>
             <a:endParaRPr lang="en-US"/>
           </a:p>
@@ -2384,7 +2384,7 @@
           <a:p>
             <a:fld id="{8D1FA75D-8100-4247-9756-C5A9A699BECD}" type="datetimeFigureOut">
               <a:rPr lang="en-US" smtClean="0"/>
-              <a:t>10-Sep-17</a:t>
+              <a:t>12-Sep-17</a:t>
             </a:fld>
             <a:endParaRPr lang="en-US"/>
           </a:p>
@@ -2672,7 +2672,7 @@
           <a:p>
             <a:fld id="{8D1FA75D-8100-4247-9756-C5A9A699BECD}" type="datetimeFigureOut">
               <a:rPr lang="en-US" smtClean="0"/>
-              <a:t>10-Sep-17</a:t>
+              <a:t>12-Sep-17</a:t>
             </a:fld>
             <a:endParaRPr lang="en-US"/>
           </a:p>
@@ -2913,7 +2913,7 @@
           <a:p>
             <a:fld id="{8D1FA75D-8100-4247-9756-C5A9A699BECD}" type="datetimeFigureOut">
               <a:rPr lang="en-US" smtClean="0"/>
-              <a:t>10-Sep-17</a:t>
+              <a:t>12-Sep-17</a:t>
             </a:fld>
             <a:endParaRPr lang="en-US"/>
           </a:p>
@@ -3332,6 +3332,72 @@
       </p:grpSpPr>
       <p:sp>
         <p:nvSpPr>
+          <p:cNvPr id="51" name="Rectangle 50">
+            <a:extLst>
+              <a:ext uri="{FF2B5EF4-FFF2-40B4-BE49-F238E27FC236}">
+                <a16:creationId xmlns:a16="http://schemas.microsoft.com/office/drawing/2014/main" id="{87042533-C61F-47AB-A2C1-299D2CCA8689}"/>
+              </a:ext>
+            </a:extLst>
+          </p:cNvPr>
+          <p:cNvSpPr/>
+          <p:nvPr/>
+        </p:nvSpPr>
+        <p:spPr>
+          <a:xfrm>
+            <a:off x="5546588" y="407149"/>
+            <a:ext cx="1454656" cy="5087100"/>
+          </a:xfrm>
+          <a:prstGeom prst="rect">
+            <a:avLst/>
+          </a:prstGeom>
+          <a:solidFill>
+            <a:schemeClr val="accent4">
+              <a:lumMod val="20000"/>
+              <a:lumOff val="80000"/>
+            </a:schemeClr>
+          </a:solidFill>
+          <a:ln>
+            <a:solidFill>
+              <a:schemeClr val="tx1"/>
+            </a:solidFill>
+          </a:ln>
+        </p:spPr>
+        <p:style>
+          <a:lnRef idx="2">
+            <a:schemeClr val="accent1">
+              <a:shade val="50000"/>
+            </a:schemeClr>
+          </a:lnRef>
+          <a:fillRef idx="1">
+            <a:schemeClr val="accent1"/>
+          </a:fillRef>
+          <a:effectRef idx="0">
+            <a:schemeClr val="accent1"/>
+          </a:effectRef>
+          <a:fontRef idx="minor">
+            <a:schemeClr val="lt1"/>
+          </a:fontRef>
+        </p:style>
+        <p:txBody>
+          <a:bodyPr rtlCol="0" anchor="b"/>
+          <a:lstStyle/>
+          <a:p>
+            <a:pPr algn="ctr"/>
+            <a:r>
+              <a:rPr lang="en-US" sz="1400" dirty="0">
+                <a:solidFill>
+                  <a:schemeClr val="tx1"/>
+                </a:solidFill>
+                <a:latin typeface="Segoe UI Light" panose="020B0502040204020203" pitchFamily="34" charset="0"/>
+                <a:cs typeface="Segoe UI Light" panose="020B0502040204020203" pitchFamily="34" charset="0"/>
+              </a:rPr>
+              <a:t>Cosmos DB</a:t>
+            </a:r>
+          </a:p>
+        </p:txBody>
+      </p:sp>
+      <p:sp>
+        <p:nvSpPr>
           <p:cNvPr id="36" name="Rectangle 35">
             <a:extLst>
               <a:ext uri="{FF2B5EF4-FFF2-40B4-BE49-F238E27FC236}">
@@ -3410,7 +3476,7 @@
         <p:spPr>
           <a:xfrm>
             <a:off x="3747048" y="415564"/>
-            <a:ext cx="3211314" cy="6040415"/>
+            <a:ext cx="1657291" cy="6040415"/>
           </a:xfrm>
           <a:prstGeom prst="rect">
             <a:avLst/>
@@ -3509,9 +3575,9 @@
             <a:avLst/>
           </a:prstGeom>
           <a:solidFill>
-            <a:schemeClr val="accent4">
-              <a:lumMod val="20000"/>
-              <a:lumOff val="80000"/>
+            <a:schemeClr val="accent5">
+              <a:lumMod val="40000"/>
+              <a:lumOff val="60000"/>
             </a:schemeClr>
           </a:solidFill>
           <a:ln>
@@ -3910,10 +3976,10 @@
       </p:pic>
       <p:pic>
         <p:nvPicPr>
-          <p:cNvPr id="13" name="Picture 12">
-            <a:extLst>
-              <a:ext uri="{FF2B5EF4-FFF2-40B4-BE49-F238E27FC236}">
-                <a16:creationId xmlns:a16="http://schemas.microsoft.com/office/drawing/2014/main" id="{690697F5-0F50-48E1-95DA-63D1FCD375A5}"/>
+          <p:cNvPr id="15" name="Picture 14">
+            <a:extLst>
+              <a:ext uri="{FF2B5EF4-FFF2-40B4-BE49-F238E27FC236}">
+                <a16:creationId xmlns:a16="http://schemas.microsoft.com/office/drawing/2014/main" id="{90FD2550-8834-45C5-805E-343177E50E82}"/>
               </a:ext>
             </a:extLst>
           </p:cNvPr>
@@ -3936,7 +4002,7 @@
         </p:blipFill>
         <p:spPr>
           <a:xfrm>
-            <a:off x="5622230" y="733485"/>
+            <a:off x="8113426" y="5158960"/>
             <a:ext cx="780290" cy="780290"/>
           </a:xfrm>
           <a:prstGeom prst="rect">
@@ -3946,10 +4012,46 @@
       </p:pic>
       <p:pic>
         <p:nvPicPr>
-          <p:cNvPr id="15" name="Picture 14">
-            <a:extLst>
-              <a:ext uri="{FF2B5EF4-FFF2-40B4-BE49-F238E27FC236}">
-                <a16:creationId xmlns:a16="http://schemas.microsoft.com/office/drawing/2014/main" id="{90FD2550-8834-45C5-805E-343177E50E82}"/>
+          <p:cNvPr id="18" name="Picture 17">
+            <a:extLst>
+              <a:ext uri="{FF2B5EF4-FFF2-40B4-BE49-F238E27FC236}">
+                <a16:creationId xmlns:a16="http://schemas.microsoft.com/office/drawing/2014/main" id="{1E17A7BF-C1E1-4044-89B6-AC04A2545E19}"/>
+              </a:ext>
+            </a:extLst>
+          </p:cNvPr>
+          <p:cNvPicPr>
+            <a:picLocks noChangeAspect="1"/>
+          </p:cNvPicPr>
+          <p:nvPr/>
+        </p:nvPicPr>
+        <p:blipFill>
+          <a:blip r:embed="rId3">
+            <a:extLst>
+              <a:ext uri="{28A0092B-C50C-407E-A947-70E740481C1C}">
+                <a14:useLocalDpi xmlns:a14="http://schemas.microsoft.com/office/drawing/2010/main" val="0"/>
+              </a:ext>
+            </a:extLst>
+          </a:blip>
+          <a:stretch>
+            <a:fillRect/>
+          </a:stretch>
+        </p:blipFill>
+        <p:spPr>
+          <a:xfrm>
+            <a:off x="4401956" y="1975684"/>
+            <a:ext cx="780290" cy="780290"/>
+          </a:xfrm>
+          <a:prstGeom prst="rect">
+            <a:avLst/>
+          </a:prstGeom>
+        </p:spPr>
+      </p:pic>
+      <p:pic>
+        <p:nvPicPr>
+          <p:cNvPr id="20" name="Picture 19">
+            <a:extLst>
+              <a:ext uri="{FF2B5EF4-FFF2-40B4-BE49-F238E27FC236}">
+                <a16:creationId xmlns:a16="http://schemas.microsoft.com/office/drawing/2014/main" id="{A8E9C371-A0B8-4563-A7D2-1F0AC8131110}"/>
               </a:ext>
             </a:extLst>
           </p:cNvPr>
@@ -3972,7 +4074,7 @@
         </p:blipFill>
         <p:spPr>
           <a:xfrm>
-            <a:off x="8113426" y="5158960"/>
+            <a:off x="4401956" y="2801739"/>
             <a:ext cx="780290" cy="780290"/>
           </a:xfrm>
           <a:prstGeom prst="rect">
@@ -3982,10 +4084,10 @@
       </p:pic>
       <p:pic>
         <p:nvPicPr>
-          <p:cNvPr id="18" name="Picture 17">
-            <a:extLst>
-              <a:ext uri="{FF2B5EF4-FFF2-40B4-BE49-F238E27FC236}">
-                <a16:creationId xmlns:a16="http://schemas.microsoft.com/office/drawing/2014/main" id="{1E17A7BF-C1E1-4044-89B6-AC04A2545E19}"/>
+          <p:cNvPr id="27" name="Picture 26">
+            <a:extLst>
+              <a:ext uri="{FF2B5EF4-FFF2-40B4-BE49-F238E27FC236}">
+                <a16:creationId xmlns:a16="http://schemas.microsoft.com/office/drawing/2014/main" id="{5D2D98DA-6337-436A-853F-872B57843551}"/>
               </a:ext>
             </a:extLst>
           </p:cNvPr>
@@ -4008,7 +4110,7 @@
         </p:blipFill>
         <p:spPr>
           <a:xfrm>
-            <a:off x="4401956" y="1975684"/>
+            <a:off x="4401956" y="3627793"/>
             <a:ext cx="780290" cy="780290"/>
           </a:xfrm>
           <a:prstGeom prst="rect">
@@ -4018,10 +4120,10 @@
       </p:pic>
       <p:pic>
         <p:nvPicPr>
-          <p:cNvPr id="20" name="Picture 19">
-            <a:extLst>
-              <a:ext uri="{FF2B5EF4-FFF2-40B4-BE49-F238E27FC236}">
-                <a16:creationId xmlns:a16="http://schemas.microsoft.com/office/drawing/2014/main" id="{A8E9C371-A0B8-4563-A7D2-1F0AC8131110}"/>
+          <p:cNvPr id="35" name="Picture 34">
+            <a:extLst>
+              <a:ext uri="{FF2B5EF4-FFF2-40B4-BE49-F238E27FC236}">
+                <a16:creationId xmlns:a16="http://schemas.microsoft.com/office/drawing/2014/main" id="{11F5B9DB-38E1-4674-BC5B-3DD3A7902497}"/>
               </a:ext>
             </a:extLst>
           </p:cNvPr>
@@ -4044,115 +4146,7 @@
         </p:blipFill>
         <p:spPr>
           <a:xfrm>
-            <a:off x="4401956" y="2801739"/>
-            <a:ext cx="780290" cy="780290"/>
-          </a:xfrm>
-          <a:prstGeom prst="rect">
-            <a:avLst/>
-          </a:prstGeom>
-        </p:spPr>
-      </p:pic>
-      <p:pic>
-        <p:nvPicPr>
-          <p:cNvPr id="22" name="Picture 21">
-            <a:extLst>
-              <a:ext uri="{FF2B5EF4-FFF2-40B4-BE49-F238E27FC236}">
-                <a16:creationId xmlns:a16="http://schemas.microsoft.com/office/drawing/2014/main" id="{D68FCBEF-6770-4DF6-8357-59FF270D9559}"/>
-              </a:ext>
-            </a:extLst>
-          </p:cNvPr>
-          <p:cNvPicPr>
-            <a:picLocks noChangeAspect="1"/>
-          </p:cNvPicPr>
-          <p:nvPr/>
-        </p:nvPicPr>
-        <p:blipFill>
-          <a:blip r:embed="rId4">
-            <a:extLst>
-              <a:ext uri="{28A0092B-C50C-407E-A947-70E740481C1C}">
-                <a14:useLocalDpi xmlns:a14="http://schemas.microsoft.com/office/drawing/2010/main" val="0"/>
-              </a:ext>
-            </a:extLst>
-          </a:blip>
-          <a:stretch>
-            <a:fillRect/>
-          </a:stretch>
-        </p:blipFill>
-        <p:spPr>
-          <a:xfrm>
-            <a:off x="5622230" y="2807165"/>
-            <a:ext cx="780290" cy="780290"/>
-          </a:xfrm>
-          <a:prstGeom prst="rect">
-            <a:avLst/>
-          </a:prstGeom>
-        </p:spPr>
-      </p:pic>
-      <p:pic>
-        <p:nvPicPr>
-          <p:cNvPr id="27" name="Picture 26">
-            <a:extLst>
-              <a:ext uri="{FF2B5EF4-FFF2-40B4-BE49-F238E27FC236}">
-                <a16:creationId xmlns:a16="http://schemas.microsoft.com/office/drawing/2014/main" id="{5D2D98DA-6337-436A-853F-872B57843551}"/>
-              </a:ext>
-            </a:extLst>
-          </p:cNvPr>
-          <p:cNvPicPr>
-            <a:picLocks noChangeAspect="1"/>
-          </p:cNvPicPr>
-          <p:nvPr/>
-        </p:nvPicPr>
-        <p:blipFill>
-          <a:blip r:embed="rId3">
-            <a:extLst>
-              <a:ext uri="{28A0092B-C50C-407E-A947-70E740481C1C}">
-                <a14:useLocalDpi xmlns:a14="http://schemas.microsoft.com/office/drawing/2010/main" val="0"/>
-              </a:ext>
-            </a:extLst>
-          </a:blip>
-          <a:stretch>
-            <a:fillRect/>
-          </a:stretch>
-        </p:blipFill>
-        <p:spPr>
-          <a:xfrm>
-            <a:off x="4401956" y="3627793"/>
-            <a:ext cx="780290" cy="780290"/>
-          </a:xfrm>
-          <a:prstGeom prst="rect">
-            <a:avLst/>
-          </a:prstGeom>
-        </p:spPr>
-      </p:pic>
-      <p:pic>
-        <p:nvPicPr>
-          <p:cNvPr id="35" name="Picture 34">
-            <a:extLst>
-              <a:ext uri="{FF2B5EF4-FFF2-40B4-BE49-F238E27FC236}">
-                <a16:creationId xmlns:a16="http://schemas.microsoft.com/office/drawing/2014/main" id="{11F5B9DB-38E1-4674-BC5B-3DD3A7902497}"/>
-              </a:ext>
-            </a:extLst>
-          </p:cNvPr>
-          <p:cNvPicPr>
-            <a:picLocks noChangeAspect="1"/>
-          </p:cNvPicPr>
-          <p:nvPr/>
-        </p:nvPicPr>
-        <p:blipFill>
-          <a:blip r:embed="rId7">
-            <a:extLst>
-              <a:ext uri="{28A0092B-C50C-407E-A947-70E740481C1C}">
-                <a14:useLocalDpi xmlns:a14="http://schemas.microsoft.com/office/drawing/2010/main" val="0"/>
-              </a:ext>
-            </a:extLst>
-          </a:blip>
-          <a:stretch>
-            <a:fillRect/>
-          </a:stretch>
-        </p:blipFill>
-        <p:spPr>
-          <a:xfrm>
-            <a:off x="4975851" y="5190963"/>
+            <a:off x="4167417" y="5190963"/>
             <a:ext cx="780290" cy="780290"/>
           </a:xfrm>
           <a:prstGeom prst="rect">
@@ -4217,13 +4211,14 @@
           </p:cNvPr>
           <p:cNvCxnSpPr>
             <a:cxnSpLocks/>
+            <a:endCxn id="35" idx="3"/>
           </p:cNvCxnSpPr>
           <p:nvPr/>
         </p:nvCxnSpPr>
         <p:spPr>
-          <a:xfrm flipH="1">
-            <a:off x="5756141" y="5583988"/>
-            <a:ext cx="2139394" cy="8609"/>
+          <a:xfrm flipH="1" flipV="1">
+            <a:off x="4947707" y="5581108"/>
+            <a:ext cx="2947828" cy="2880"/>
           </a:xfrm>
           <a:prstGeom prst="straightConnector1">
             <a:avLst/>
@@ -4400,14 +4395,13 @@
           <p:cNvCxnSpPr>
             <a:cxnSpLocks/>
             <a:stCxn id="18" idx="3"/>
-            <a:endCxn id="22" idx="1"/>
           </p:cNvCxnSpPr>
           <p:nvPr/>
         </p:nvCxnSpPr>
         <p:spPr>
           <a:xfrm>
             <a:off x="5182246" y="2365829"/>
-            <a:ext cx="439984" cy="831481"/>
+            <a:ext cx="684414" cy="780118"/>
           </a:xfrm>
           <a:prstGeom prst="straightConnector1">
             <a:avLst/>
@@ -4446,14 +4440,13 @@
           <p:cNvCxnSpPr>
             <a:cxnSpLocks/>
             <a:stCxn id="27" idx="3"/>
-            <a:endCxn id="22" idx="1"/>
           </p:cNvCxnSpPr>
           <p:nvPr/>
         </p:nvCxnSpPr>
         <p:spPr>
           <a:xfrm flipV="1">
-            <a:off x="5182246" y="3197310"/>
-            <a:ext cx="439984" cy="820628"/>
+            <a:off x="5182246" y="3185768"/>
+            <a:ext cx="684414" cy="832170"/>
           </a:xfrm>
           <a:prstGeom prst="straightConnector1">
             <a:avLst/>
@@ -4492,14 +4485,13 @@
           <p:cNvCxnSpPr>
             <a:cxnSpLocks/>
             <a:stCxn id="9" idx="3"/>
-            <a:endCxn id="13" idx="1"/>
           </p:cNvCxnSpPr>
           <p:nvPr/>
         </p:nvCxnSpPr>
         <p:spPr>
           <a:xfrm>
             <a:off x="5182246" y="1123630"/>
-            <a:ext cx="439984" cy="0"/>
+            <a:ext cx="698538" cy="0"/>
           </a:xfrm>
           <a:prstGeom prst="straightConnector1">
             <a:avLst/>
@@ -4630,7 +4622,7 @@
           <p:nvPr/>
         </p:nvPicPr>
         <p:blipFill>
-          <a:blip r:embed="rId8">
+          <a:blip r:embed="rId7">
             <a:extLst>
               <a:ext uri="{28A0092B-C50C-407E-A947-70E740481C1C}">
                 <a14:useLocalDpi xmlns:a14="http://schemas.microsoft.com/office/drawing/2010/main" val="0"/>
@@ -4666,7 +4658,7 @@
           <p:nvPr/>
         </p:nvPicPr>
         <p:blipFill>
-          <a:blip r:embed="rId8">
+          <a:blip r:embed="rId7">
             <a:extLst>
               <a:ext uri="{28A0092B-C50C-407E-A947-70E740481C1C}">
                 <a14:useLocalDpi xmlns:a14="http://schemas.microsoft.com/office/drawing/2010/main" val="0"/>
@@ -4698,15 +4690,14 @@
           </p:cNvPr>
           <p:cNvCxnSpPr>
             <a:cxnSpLocks/>
-            <a:stCxn id="13" idx="3"/>
             <a:endCxn id="38" idx="1"/>
           </p:cNvCxnSpPr>
           <p:nvPr/>
         </p:nvCxnSpPr>
         <p:spPr>
           <a:xfrm>
-            <a:off x="6402520" y="1123630"/>
-            <a:ext cx="1115770" cy="0"/>
+            <a:off x="6661074" y="1123630"/>
+            <a:ext cx="857216" cy="0"/>
           </a:xfrm>
           <a:prstGeom prst="straightConnector1">
             <a:avLst/>
@@ -4748,7 +4739,7 @@
           <p:nvPr/>
         </p:nvPicPr>
         <p:blipFill>
-          <a:blip r:embed="rId8">
+          <a:blip r:embed="rId7">
             <a:extLst>
               <a:ext uri="{28A0092B-C50C-407E-A947-70E740481C1C}">
                 <a14:useLocalDpi xmlns:a14="http://schemas.microsoft.com/office/drawing/2010/main" val="0"/>
@@ -4786,8 +4777,8 @@
         </p:nvCxnSpPr>
         <p:spPr>
           <a:xfrm>
-            <a:off x="6402520" y="3191071"/>
-            <a:ext cx="1115770" cy="0"/>
+            <a:off x="6675198" y="3185768"/>
+            <a:ext cx="843092" cy="5303"/>
           </a:xfrm>
           <a:prstGeom prst="straightConnector1">
             <a:avLst/>
@@ -4860,6 +4851,114 @@
           </a:fontRef>
         </p:style>
       </p:cxnSp>
+      <p:pic>
+        <p:nvPicPr>
+          <p:cNvPr id="26" name="Picture 25">
+            <a:extLst>
+              <a:ext uri="{FF2B5EF4-FFF2-40B4-BE49-F238E27FC236}">
+                <a16:creationId xmlns:a16="http://schemas.microsoft.com/office/drawing/2014/main" id="{1A668F76-C3E6-440F-83C8-08C683C80DFB}"/>
+              </a:ext>
+            </a:extLst>
+          </p:cNvPr>
+          <p:cNvPicPr>
+            <a:picLocks noChangeAspect="1"/>
+          </p:cNvPicPr>
+          <p:nvPr/>
+        </p:nvPicPr>
+        <p:blipFill>
+          <a:blip r:embed="rId8">
+            <a:extLst>
+              <a:ext uri="{28A0092B-C50C-407E-A947-70E740481C1C}">
+                <a14:useLocalDpi xmlns:a14="http://schemas.microsoft.com/office/drawing/2010/main" val="0"/>
+              </a:ext>
+            </a:extLst>
+          </a:blip>
+          <a:stretch>
+            <a:fillRect/>
+          </a:stretch>
+        </p:blipFill>
+        <p:spPr>
+          <a:xfrm>
+            <a:off x="5880784" y="2740167"/>
+            <a:ext cx="780290" cy="780290"/>
+          </a:xfrm>
+          <a:prstGeom prst="rect">
+            <a:avLst/>
+          </a:prstGeom>
+        </p:spPr>
+      </p:pic>
+      <p:pic>
+        <p:nvPicPr>
+          <p:cNvPr id="41" name="Picture 40">
+            <a:extLst>
+              <a:ext uri="{FF2B5EF4-FFF2-40B4-BE49-F238E27FC236}">
+                <a16:creationId xmlns:a16="http://schemas.microsoft.com/office/drawing/2014/main" id="{338F57C6-38C1-4D7B-96F3-FC38ED148956}"/>
+              </a:ext>
+            </a:extLst>
+          </p:cNvPr>
+          <p:cNvPicPr>
+            <a:picLocks noChangeAspect="1"/>
+          </p:cNvPicPr>
+          <p:nvPr/>
+        </p:nvPicPr>
+        <p:blipFill>
+          <a:blip r:embed="rId8">
+            <a:extLst>
+              <a:ext uri="{28A0092B-C50C-407E-A947-70E740481C1C}">
+                <a14:useLocalDpi xmlns:a14="http://schemas.microsoft.com/office/drawing/2010/main" val="0"/>
+              </a:ext>
+            </a:extLst>
+          </a:blip>
+          <a:stretch>
+            <a:fillRect/>
+          </a:stretch>
+        </p:blipFill>
+        <p:spPr>
+          <a:xfrm>
+            <a:off x="5880784" y="654125"/>
+            <a:ext cx="780290" cy="780290"/>
+          </a:xfrm>
+          <a:prstGeom prst="rect">
+            <a:avLst/>
+          </a:prstGeom>
+        </p:spPr>
+      </p:pic>
+      <p:pic>
+        <p:nvPicPr>
+          <p:cNvPr id="7" name="Picture 6">
+            <a:extLst>
+              <a:ext uri="{FF2B5EF4-FFF2-40B4-BE49-F238E27FC236}">
+                <a16:creationId xmlns:a16="http://schemas.microsoft.com/office/drawing/2014/main" id="{69AE9D5E-1B55-44F8-9CA3-91272D02E141}"/>
+              </a:ext>
+            </a:extLst>
+          </p:cNvPr>
+          <p:cNvPicPr>
+            <a:picLocks noChangeAspect="1"/>
+          </p:cNvPicPr>
+          <p:nvPr/>
+        </p:nvPicPr>
+        <p:blipFill>
+          <a:blip r:embed="rId9">
+            <a:extLst>
+              <a:ext uri="{28A0092B-C50C-407E-A947-70E740481C1C}">
+                <a14:useLocalDpi xmlns:a14="http://schemas.microsoft.com/office/drawing/2010/main" val="0"/>
+              </a:ext>
+            </a:extLst>
+          </a:blip>
+          <a:stretch>
+            <a:fillRect/>
+          </a:stretch>
+        </p:blipFill>
+        <p:spPr>
+          <a:xfrm>
+            <a:off x="5880784" y="4481658"/>
+            <a:ext cx="780290" cy="780290"/>
+          </a:xfrm>
+          <a:prstGeom prst="rect">
+            <a:avLst/>
+          </a:prstGeom>
+        </p:spPr>
+      </p:pic>
     </p:spTree>
     <p:extLst>
       <p:ext uri="{BB962C8B-B14F-4D97-AF65-F5344CB8AC3E}">

</xml_diff>